<commit_message>
Minor fixes for "11-Exception-Handling"
</commit_message>
<xml_diff>
--- a/Courses/Software-Sciences/Module-2-DS-and-Algo-New/11-Exception-Handling/11-Exception-Handling.pptx
+++ b/Courses/Software-Sciences/Module-2-DS-and-Algo-New/11-Exception-Handling/11-Exception-Handling.pptx
@@ -321,7 +321,7 @@
           <a:p>
             <a:fld id="{4E087215-0C8F-4762-A664-737A353EC9A4}" type="datetimeFigureOut">
               <a:rPr lang="bg-BG" smtClean="0"/>
-              <a:t>16.2.2023 г.</a:t>
+              <a:t>24.2.2023 г.</a:t>
             </a:fld>
             <a:endParaRPr lang="bg-BG" dirty="0"/>
           </a:p>
@@ -512,7 +512,7 @@
           <a:p>
             <a:fld id="{72D84649-876A-46C9-8472-14CB09C070D8}" type="datetimeFigureOut">
               <a:rPr lang="en-US" smtClean="0"/>
-              <a:t>2/16/2023</a:t>
+              <a:t>2/24/2023</a:t>
             </a:fld>
             <a:endParaRPr lang="en-US" dirty="0"/>
           </a:p>
@@ -19477,15 +19477,33 @@
                                   </p:childTnLst>
                                 </p:cTn>
                               </p:par>
+                            </p:childTnLst>
+                          </p:cTn>
+                        </p:par>
+                      </p:childTnLst>
+                    </p:cTn>
+                  </p:par>
+                  <p:par>
+                    <p:cTn id="11" fill="hold">
+                      <p:stCondLst>
+                        <p:cond delay="indefinite"/>
+                      </p:stCondLst>
+                      <p:childTnLst>
+                        <p:par>
+                          <p:cTn id="12" fill="hold">
+                            <p:stCondLst>
+                              <p:cond delay="0"/>
+                            </p:stCondLst>
+                            <p:childTnLst>
                               <p:par>
-                                <p:cTn id="11" presetID="1" presetClass="entr" presetSubtype="0" fill="hold" nodeType="withEffect">
+                                <p:cTn id="13" presetID="1" presetClass="entr" presetSubtype="0" fill="hold" nodeType="clickEffect">
                                   <p:stCondLst>
                                     <p:cond delay="0"/>
                                   </p:stCondLst>
                                   <p:childTnLst>
                                     <p:set>
                                       <p:cBhvr>
-                                        <p:cTn id="12" dur="1" fill="hold">
+                                        <p:cTn id="14" dur="1" fill="hold">
                                           <p:stCondLst>
                                             <p:cond delay="0"/>
                                           </p:stCondLst>
@@ -19515,26 +19533,26 @@
                     </p:cTn>
                   </p:par>
                   <p:par>
-                    <p:cTn id="13" fill="hold">
+                    <p:cTn id="15" fill="hold">
                       <p:stCondLst>
                         <p:cond delay="indefinite"/>
                       </p:stCondLst>
                       <p:childTnLst>
                         <p:par>
-                          <p:cTn id="14" fill="hold">
+                          <p:cTn id="16" fill="hold">
                             <p:stCondLst>
                               <p:cond delay="0"/>
                             </p:stCondLst>
                             <p:childTnLst>
                               <p:par>
-                                <p:cTn id="15" presetID="1" presetClass="entr" presetSubtype="0" fill="hold" nodeType="clickEffect">
+                                <p:cTn id="17" presetID="1" presetClass="entr" presetSubtype="0" fill="hold" nodeType="clickEffect">
                                   <p:stCondLst>
                                     <p:cond delay="0"/>
                                   </p:stCondLst>
                                   <p:childTnLst>
                                     <p:set>
                                       <p:cBhvr>
-                                        <p:cTn id="16" dur="1" fill="hold">
+                                        <p:cTn id="18" dur="1" fill="hold">
                                           <p:stCondLst>
                                             <p:cond delay="0"/>
                                           </p:stCondLst>
@@ -20560,15 +20578,33 @@
                                   </p:childTnLst>
                                 </p:cTn>
                               </p:par>
+                            </p:childTnLst>
+                          </p:cTn>
+                        </p:par>
+                      </p:childTnLst>
+                    </p:cTn>
+                  </p:par>
+                  <p:par>
+                    <p:cTn id="7" fill="hold">
+                      <p:stCondLst>
+                        <p:cond delay="indefinite"/>
+                      </p:stCondLst>
+                      <p:childTnLst>
+                        <p:par>
+                          <p:cTn id="8" fill="hold">
+                            <p:stCondLst>
+                              <p:cond delay="0"/>
+                            </p:stCondLst>
+                            <p:childTnLst>
                               <p:par>
-                                <p:cTn id="7" presetID="1" presetClass="entr" presetSubtype="0" fill="hold" nodeType="withEffect">
+                                <p:cTn id="9" presetID="1" presetClass="entr" presetSubtype="0" fill="hold" nodeType="clickEffect">
                                   <p:stCondLst>
                                     <p:cond delay="0"/>
                                   </p:stCondLst>
                                   <p:childTnLst>
                                     <p:set>
                                       <p:cBhvr>
-                                        <p:cTn id="8" dur="1" fill="hold">
+                                        <p:cTn id="10" dur="1" fill="hold">
                                           <p:stCondLst>
                                             <p:cond delay="0"/>
                                           </p:stCondLst>
@@ -20598,26 +20634,26 @@
                     </p:cTn>
                   </p:par>
                   <p:par>
-                    <p:cTn id="9" fill="hold">
+                    <p:cTn id="11" fill="hold">
                       <p:stCondLst>
                         <p:cond delay="indefinite"/>
                       </p:stCondLst>
                       <p:childTnLst>
                         <p:par>
-                          <p:cTn id="10" fill="hold">
+                          <p:cTn id="12" fill="hold">
                             <p:stCondLst>
                               <p:cond delay="0"/>
                             </p:stCondLst>
                             <p:childTnLst>
                               <p:par>
-                                <p:cTn id="11" presetID="1" presetClass="entr" presetSubtype="0" fill="hold" nodeType="clickEffect">
+                                <p:cTn id="13" presetID="1" presetClass="entr" presetSubtype="0" fill="hold" nodeType="clickEffect">
                                   <p:stCondLst>
                                     <p:cond delay="0"/>
                                   </p:stCondLst>
                                   <p:childTnLst>
                                     <p:set>
                                       <p:cBhvr>
-                                        <p:cTn id="12" dur="1" fill="hold">
+                                        <p:cTn id="14" dur="1" fill="hold">
                                           <p:stCondLst>
                                             <p:cond delay="0"/>
                                           </p:stCondLst>
@@ -20647,26 +20683,26 @@
                     </p:cTn>
                   </p:par>
                   <p:par>
-                    <p:cTn id="13" fill="hold">
+                    <p:cTn id="15" fill="hold">
                       <p:stCondLst>
                         <p:cond delay="indefinite"/>
                       </p:stCondLst>
                       <p:childTnLst>
                         <p:par>
-                          <p:cTn id="14" fill="hold">
+                          <p:cTn id="16" fill="hold">
                             <p:stCondLst>
                               <p:cond delay="0"/>
                             </p:stCondLst>
                             <p:childTnLst>
                               <p:par>
-                                <p:cTn id="15" presetID="1" presetClass="entr" presetSubtype="0" fill="hold" nodeType="clickEffect">
+                                <p:cTn id="17" presetID="1" presetClass="entr" presetSubtype="0" fill="hold" nodeType="clickEffect">
                                   <p:stCondLst>
                                     <p:cond delay="0"/>
                                   </p:stCondLst>
                                   <p:childTnLst>
                                     <p:set>
                                       <p:cBhvr>
-                                        <p:cTn id="16" dur="1" fill="hold">
+                                        <p:cTn id="18" dur="1" fill="hold">
                                           <p:stCondLst>
                                             <p:cond delay="0"/>
                                           </p:stCondLst>
@@ -20696,26 +20732,26 @@
                     </p:cTn>
                   </p:par>
                   <p:par>
-                    <p:cTn id="17" fill="hold">
+                    <p:cTn id="19" fill="hold">
                       <p:stCondLst>
                         <p:cond delay="indefinite"/>
                       </p:stCondLst>
                       <p:childTnLst>
                         <p:par>
-                          <p:cTn id="18" fill="hold">
+                          <p:cTn id="20" fill="hold">
                             <p:stCondLst>
                               <p:cond delay="0"/>
                             </p:stCondLst>
                             <p:childTnLst>
                               <p:par>
-                                <p:cTn id="19" presetID="1" presetClass="entr" presetSubtype="0" fill="hold" nodeType="clickEffect">
+                                <p:cTn id="21" presetID="1" presetClass="entr" presetSubtype="0" fill="hold" nodeType="clickEffect">
                                   <p:stCondLst>
                                     <p:cond delay="0"/>
                                   </p:stCondLst>
                                   <p:childTnLst>
                                     <p:set>
                                       <p:cBhvr>
-                                        <p:cTn id="20" dur="1" fill="hold">
+                                        <p:cTn id="22" dur="1" fill="hold">
                                           <p:stCondLst>
                                             <p:cond delay="0"/>
                                           </p:stCondLst>
@@ -20745,26 +20781,26 @@
                     </p:cTn>
                   </p:par>
                   <p:par>
-                    <p:cTn id="21" fill="hold">
+                    <p:cTn id="23" fill="hold">
                       <p:stCondLst>
                         <p:cond delay="indefinite"/>
                       </p:stCondLst>
                       <p:childTnLst>
                         <p:par>
-                          <p:cTn id="22" fill="hold">
+                          <p:cTn id="24" fill="hold">
                             <p:stCondLst>
                               <p:cond delay="0"/>
                             </p:stCondLst>
                             <p:childTnLst>
                               <p:par>
-                                <p:cTn id="23" presetID="1" presetClass="entr" presetSubtype="0" fill="hold" nodeType="clickEffect">
+                                <p:cTn id="25" presetID="1" presetClass="entr" presetSubtype="0" fill="hold" nodeType="clickEffect">
                                   <p:stCondLst>
                                     <p:cond delay="0"/>
                                   </p:stCondLst>
                                   <p:childTnLst>
                                     <p:set>
                                       <p:cBhvr>
-                                        <p:cTn id="24" dur="1" fill="hold">
+                                        <p:cTn id="26" dur="1" fill="hold">
                                           <p:stCondLst>
                                             <p:cond delay="0"/>
                                           </p:stCondLst>
@@ -24472,11 +24508,11 @@
   <p:clrMapOvr>
     <a:masterClrMapping/>
   </p:clrMapOvr>
-  <mc:AlternateContent xmlns:mc="http://schemas.openxmlformats.org/markup-compatibility/2006">
-    <mc:Choice xmlns:p14="http://schemas.microsoft.com/office/powerpoint/2010/main" Requires="p14">
+  <mc:AlternateContent xmlns:mc="http://schemas.openxmlformats.org/markup-compatibility/2006" xmlns:p14="http://schemas.microsoft.com/office/powerpoint/2010/main">
+    <mc:Choice Requires="p14">
       <p:transition p14:dur="10" advClick="0" advTm="5000"/>
     </mc:Choice>
-    <mc:Fallback>
+    <mc:Fallback xmlns="">
       <p:transition advClick="0" advTm="5000"/>
     </mc:Fallback>
   </mc:AlternateContent>
@@ -26570,8 +26606,8 @@
         </p:nvSpPr>
         <p:spPr bwMode="auto">
           <a:xfrm>
-            <a:off x="2316000" y="2394000"/>
-            <a:ext cx="8496944" cy="2618653"/>
+            <a:off x="1551000" y="2304000"/>
+            <a:ext cx="10710000" cy="2618653"/>
           </a:xfrm>
           <a:prstGeom prst="rect">
             <a:avLst/>
@@ -26625,7 +26661,27 @@
                 <a:latin typeface="Consolas" pitchFamily="49" charset="0"/>
                 <a:cs typeface="Consolas" pitchFamily="49" charset="0"/>
               </a:rPr>
-              <a:t>  // Do some work that can raise an exception</a:t>
+              <a:t>  // </a:t>
+            </a:r>
+            <a:r>
+              <a:rPr lang="bg-BG" sz="2600" b="1" i="1" noProof="1">
+                <a:solidFill>
+                  <a:schemeClr val="accent2"/>
+                </a:solidFill>
+                <a:latin typeface="Consolas" pitchFamily="49" charset="0"/>
+                <a:cs typeface="Consolas" pitchFamily="49" charset="0"/>
+              </a:rPr>
+              <a:t>Използвайте код, който може да предизвика </a:t>
+            </a:r>
+            <a:r>
+              <a:rPr lang="en-US" sz="2600" b="1" i="1" noProof="1">
+                <a:solidFill>
+                  <a:schemeClr val="accent2"/>
+                </a:solidFill>
+                <a:latin typeface="Consolas" pitchFamily="49" charset="0"/>
+                <a:cs typeface="Consolas" pitchFamily="49" charset="0"/>
+              </a:rPr>
+              <a:t>exception</a:t>
             </a:r>
           </a:p>
           <a:p>
@@ -26685,7 +26741,27 @@
                 <a:latin typeface="Consolas" pitchFamily="49" charset="0"/>
                 <a:cs typeface="Consolas" pitchFamily="49" charset="0"/>
               </a:rPr>
-              <a:t>  // Handle the caught exception</a:t>
+              <a:t>  // </a:t>
+            </a:r>
+            <a:r>
+              <a:rPr lang="bg-BG" sz="2600" b="1" i="1" noProof="1">
+                <a:solidFill>
+                  <a:schemeClr val="accent2"/>
+                </a:solidFill>
+                <a:latin typeface="Consolas" pitchFamily="49" charset="0"/>
+                <a:cs typeface="Consolas" pitchFamily="49" charset="0"/>
+              </a:rPr>
+              <a:t>Хващане на </a:t>
+            </a:r>
+            <a:r>
+              <a:rPr lang="en-US" sz="2600" b="1" i="1" noProof="1">
+                <a:solidFill>
+                  <a:schemeClr val="accent2"/>
+                </a:solidFill>
+                <a:latin typeface="Consolas" pitchFamily="49" charset="0"/>
+                <a:cs typeface="Consolas" pitchFamily="49" charset="0"/>
+              </a:rPr>
+              <a:t>exception</a:t>
             </a:r>
           </a:p>
           <a:p>

</xml_diff>